<commit_message>
Update CeTI Bloc 2
</commit_message>
<xml_diff>
--- a/CeTI/b1_capteurs/B1_1_capteurs.pptx
+++ b/CeTI/b1_capteurs/B1_1_capteurs.pptx
@@ -5,12 +5,15 @@
     <p:sldMasterId id="2147483711" r:id="rId1"/>
   </p:sldMasterIdLst>
   <p:notesMasterIdLst>
-    <p:notesMasterId r:id="rId5"/>
+    <p:notesMasterId r:id="rId8"/>
   </p:notesMasterIdLst>
   <p:sldIdLst>
     <p:sldId id="256" r:id="rId2"/>
     <p:sldId id="272" r:id="rId3"/>
     <p:sldId id="273" r:id="rId4"/>
+    <p:sldId id="274" r:id="rId5"/>
+    <p:sldId id="275" r:id="rId6"/>
+    <p:sldId id="276" r:id="rId7"/>
   </p:sldIdLst>
   <p:sldSz cx="12192000" cy="6858000"/>
   <p:notesSz cx="6858000" cy="9144000"/>
@@ -210,7 +213,7 @@
           <a:p>
             <a:fld id="{729C724E-499D-43AC-8699-CF969D2466FC}" type="datetimeFigureOut">
               <a:rPr lang="fr-FR" smtClean="0"/>
-              <a:t>22/06/2023</a:t>
+              <a:t>20/07/2023</a:t>
             </a:fld>
             <a:endParaRPr lang="fr-FR"/>
           </a:p>
@@ -633,7 +636,7 @@
           <a:p>
             <a:fld id="{02AC24A9-CCB6-4F8D-B8DB-C2F3692CFA5A}" type="datetimeFigureOut">
               <a:rPr lang="en-US" smtClean="0"/>
-              <a:t>6/22/2023</a:t>
+              <a:t>7/20/2023</a:t>
             </a:fld>
             <a:endParaRPr lang="en-US" dirty="0"/>
           </a:p>
@@ -1003,7 +1006,7 @@
           <a:p>
             <a:fld id="{02AC24A9-CCB6-4F8D-B8DB-C2F3692CFA5A}" type="datetimeFigureOut">
               <a:rPr lang="en-US" smtClean="0"/>
-              <a:t>6/22/2023</a:t>
+              <a:t>7/20/2023</a:t>
             </a:fld>
             <a:endParaRPr lang="en-US"/>
           </a:p>
@@ -1212,7 +1215,7 @@
           <a:p>
             <a:fld id="{02AC24A9-CCB6-4F8D-B8DB-C2F3692CFA5A}" type="datetimeFigureOut">
               <a:rPr lang="en-US" smtClean="0"/>
-              <a:t>6/22/2023</a:t>
+              <a:t>7/20/2023</a:t>
             </a:fld>
             <a:endParaRPr lang="en-US"/>
           </a:p>
@@ -1682,7 +1685,7 @@
           <a:p>
             <a:fld id="{02AC24A9-CCB6-4F8D-B8DB-C2F3692CFA5A}" type="datetimeFigureOut">
               <a:rPr lang="en-US" smtClean="0"/>
-              <a:t>6/22/2023</a:t>
+              <a:t>7/20/2023</a:t>
             </a:fld>
             <a:endParaRPr lang="en-US"/>
           </a:p>
@@ -2136,7 +2139,7 @@
           <a:p>
             <a:fld id="{02AC24A9-CCB6-4F8D-B8DB-C2F3692CFA5A}" type="datetimeFigureOut">
               <a:rPr lang="en-US" smtClean="0"/>
-              <a:t>6/22/2023</a:t>
+              <a:t>7/20/2023</a:t>
             </a:fld>
             <a:endParaRPr lang="en-US"/>
           </a:p>
@@ -2668,7 +2671,7 @@
           <a:p>
             <a:fld id="{02AC24A9-CCB6-4F8D-B8DB-C2F3692CFA5A}" type="datetimeFigureOut">
               <a:rPr lang="en-US" smtClean="0"/>
-              <a:t>6/22/2023</a:t>
+              <a:t>7/20/2023</a:t>
             </a:fld>
             <a:endParaRPr lang="en-US"/>
           </a:p>
@@ -3367,7 +3370,7 @@
           <a:p>
             <a:fld id="{02AC24A9-CCB6-4F8D-B8DB-C2F3692CFA5A}" type="datetimeFigureOut">
               <a:rPr lang="en-US" smtClean="0"/>
-              <a:t>6/22/2023</a:t>
+              <a:t>7/20/2023</a:t>
             </a:fld>
             <a:endParaRPr lang="en-US"/>
           </a:p>
@@ -3696,7 +3699,7 @@
           <a:p>
             <a:fld id="{02AC24A9-CCB6-4F8D-B8DB-C2F3692CFA5A}" type="datetimeFigureOut">
               <a:rPr lang="en-US" smtClean="0"/>
-              <a:t>6/22/2023</a:t>
+              <a:t>7/20/2023</a:t>
             </a:fld>
             <a:endParaRPr lang="en-US"/>
           </a:p>
@@ -3809,7 +3812,7 @@
           <a:p>
             <a:fld id="{02AC24A9-CCB6-4F8D-B8DB-C2F3692CFA5A}" type="datetimeFigureOut">
               <a:rPr lang="en-US" smtClean="0"/>
-              <a:t>6/22/2023</a:t>
+              <a:t>7/20/2023</a:t>
             </a:fld>
             <a:endParaRPr lang="en-US"/>
           </a:p>
@@ -4304,7 +4307,7 @@
           <a:p>
             <a:fld id="{02AC24A9-CCB6-4F8D-B8DB-C2F3692CFA5A}" type="datetimeFigureOut">
               <a:rPr lang="en-US" smtClean="0"/>
-              <a:t>6/22/2023</a:t>
+              <a:t>7/20/2023</a:t>
             </a:fld>
             <a:endParaRPr lang="en-US" dirty="0"/>
           </a:p>
@@ -4781,7 +4784,7 @@
           <a:p>
             <a:fld id="{02AC24A9-CCB6-4F8D-B8DB-C2F3692CFA5A}" type="datetimeFigureOut">
               <a:rPr lang="en-US" smtClean="0"/>
-              <a:t>6/22/2023</a:t>
+              <a:t>7/20/2023</a:t>
             </a:fld>
             <a:endParaRPr lang="en-US"/>
           </a:p>
@@ -5024,7 +5027,7 @@
           <a:p>
             <a:fld id="{02AC24A9-CCB6-4F8D-B8DB-C2F3692CFA5A}" type="datetimeFigureOut">
               <a:rPr lang="en-US" smtClean="0"/>
-              <a:t>6/22/2023</a:t>
+              <a:t>7/20/2023</a:t>
             </a:fld>
             <a:endParaRPr lang="en-US"/>
           </a:p>
@@ -6913,7 +6916,7 @@
         <p:spPr>
           <a:xfrm>
             <a:off x="1115568" y="2478024"/>
-            <a:ext cx="4937760" cy="3694176"/>
+            <a:ext cx="5152710" cy="3694176"/>
           </a:xfrm>
         </p:spPr>
         <p:txBody>
@@ -6939,6 +6942,16 @@
             <a:r>
               <a:rPr lang="fr-FR" dirty="0"/>
               <a:t>Elever une tension</a:t>
+            </a:r>
+          </a:p>
+          <a:p>
+            <a:pPr>
+              <a:buFont typeface="Arial" panose="020B0604020202020204" pitchFamily="34" charset="0"/>
+              <a:buChar char="•"/>
+            </a:pPr>
+            <a:r>
+              <a:rPr lang="fr-FR" dirty="0"/>
+              <a:t>Limiter une tension</a:t>
             </a:r>
           </a:p>
           <a:p>
@@ -7093,7 +7106,7 @@
         </p:spPr>
         <p:txBody>
           <a:bodyPr vert="horz" lIns="91440" tIns="45720" rIns="91440" bIns="45720" rtlCol="0">
-            <a:normAutofit/>
+            <a:normAutofit fontScale="92500" lnSpcReduction="10000"/>
           </a:bodyPr>
           <a:lstStyle>
             <a:lvl1pPr marL="228600" indent="-228600" algn="l" defTabSz="914400" rtl="0" eaLnBrk="1" latinLnBrk="0" hangingPunct="1">
@@ -7290,12 +7303,513 @@
               <a:t>ALI </a:t>
             </a:r>
           </a:p>
+          <a:p>
+            <a:r>
+              <a:rPr lang="fr-FR" sz="1800" dirty="0"/>
+              <a:t>Fiche Résumé :</a:t>
+            </a:r>
+            <a:r>
+              <a:rPr lang="fr-FR" sz="1800" b="1" dirty="0"/>
+              <a:t> Diodes</a:t>
+            </a:r>
+          </a:p>
         </p:txBody>
       </p:sp>
     </p:spTree>
     <p:extLst>
       <p:ext uri="{BB962C8B-B14F-4D97-AF65-F5344CB8AC3E}">
         <p14:creationId xmlns:p14="http://schemas.microsoft.com/office/powerpoint/2010/main" val="1095407778"/>
+      </p:ext>
+    </p:extLst>
+  </p:cSld>
+  <p:clrMapOvr>
+    <a:masterClrMapping/>
+  </p:clrMapOvr>
+</p:sld>
+</file>
+
+<file path=ppt/slides/slide4.xml><?xml version="1.0" encoding="utf-8"?>
+<p:sld xmlns:a="http://schemas.openxmlformats.org/drawingml/2006/main" xmlns:r="http://schemas.openxmlformats.org/officeDocument/2006/relationships" xmlns:p="http://schemas.openxmlformats.org/presentationml/2006/main">
+  <p:cSld>
+    <p:spTree>
+      <p:nvGrpSpPr>
+        <p:cNvPr id="1" name=""/>
+        <p:cNvGrpSpPr/>
+        <p:nvPr/>
+      </p:nvGrpSpPr>
+      <p:grpSpPr>
+        <a:xfrm>
+          <a:off x="0" y="0"/>
+          <a:ext cx="0" cy="0"/>
+          <a:chOff x="0" y="0"/>
+          <a:chExt cx="0" cy="0"/>
+        </a:xfrm>
+      </p:grpSpPr>
+      <p:sp>
+        <p:nvSpPr>
+          <p:cNvPr id="2" name="Titre 1">
+            <a:extLst>
+              <a:ext uri="{FF2B5EF4-FFF2-40B4-BE49-F238E27FC236}">
+                <a16:creationId xmlns:a16="http://schemas.microsoft.com/office/drawing/2014/main" id="{90162AE8-C1B0-5C56-8313-DEE494F38273}"/>
+              </a:ext>
+            </a:extLst>
+          </p:cNvPr>
+          <p:cNvSpPr>
+            <a:spLocks noGrp="1"/>
+          </p:cNvSpPr>
+          <p:nvPr>
+            <p:ph type="title"/>
+          </p:nvPr>
+        </p:nvSpPr>
+        <p:spPr/>
+        <p:txBody>
+          <a:bodyPr/>
+          <a:lstStyle/>
+          <a:p>
+            <a:r>
+              <a:rPr lang="fr-FR" dirty="0"/>
+              <a:t>M3 - Limiter une tension</a:t>
+            </a:r>
+          </a:p>
+        </p:txBody>
+      </p:sp>
+      <p:pic>
+        <p:nvPicPr>
+          <p:cNvPr id="5" name="Image 4" descr="Une image contenant texte&#10;&#10;Description générée automatiquement">
+            <a:extLst>
+              <a:ext uri="{FF2B5EF4-FFF2-40B4-BE49-F238E27FC236}">
+                <a16:creationId xmlns:a16="http://schemas.microsoft.com/office/drawing/2014/main" id="{204ADC40-1D61-539F-22ED-6B21D67FBDE6}"/>
+              </a:ext>
+            </a:extLst>
+          </p:cNvPr>
+          <p:cNvPicPr>
+            <a:picLocks noChangeAspect="1"/>
+          </p:cNvPicPr>
+          <p:nvPr/>
+        </p:nvPicPr>
+        <p:blipFill>
+          <a:blip r:embed="rId2" cstate="print">
+            <a:extLst>
+              <a:ext uri="{28A0092B-C50C-407E-A947-70E740481C1C}">
+                <a14:useLocalDpi xmlns:a14="http://schemas.microsoft.com/office/drawing/2010/main" val="0"/>
+              </a:ext>
+            </a:extLst>
+          </a:blip>
+          <a:stretch>
+            <a:fillRect/>
+          </a:stretch>
+        </p:blipFill>
+        <p:spPr>
+          <a:xfrm>
+            <a:off x="202922" y="5934456"/>
+            <a:ext cx="1825291" cy="749808"/>
+          </a:xfrm>
+          <a:prstGeom prst="rect">
+            <a:avLst/>
+          </a:prstGeom>
+        </p:spPr>
+      </p:pic>
+      <p:sp>
+        <p:nvSpPr>
+          <p:cNvPr id="3" name="Espace réservé du contenu 2">
+            <a:extLst>
+              <a:ext uri="{FF2B5EF4-FFF2-40B4-BE49-F238E27FC236}">
+                <a16:creationId xmlns:a16="http://schemas.microsoft.com/office/drawing/2014/main" id="{0BEC7A2C-A17B-6386-59E3-FD868FE4C649}"/>
+              </a:ext>
+            </a:extLst>
+          </p:cNvPr>
+          <p:cNvSpPr>
+            <a:spLocks noGrp="1"/>
+          </p:cNvSpPr>
+          <p:nvPr>
+            <p:ph sz="half" idx="1"/>
+          </p:nvPr>
+        </p:nvSpPr>
+        <p:spPr>
+          <a:xfrm>
+            <a:off x="1115568" y="2478024"/>
+            <a:ext cx="5152710" cy="3694176"/>
+          </a:xfrm>
+        </p:spPr>
+        <p:txBody>
+          <a:bodyPr>
+            <a:normAutofit/>
+          </a:bodyPr>
+          <a:lstStyle/>
+          <a:p>
+            <a:pPr>
+              <a:buFont typeface="Arial" panose="020B0604020202020204" pitchFamily="34" charset="0"/>
+              <a:buChar char="•"/>
+            </a:pPr>
+            <a:r>
+              <a:rPr lang="fr-FR" dirty="0"/>
+              <a:t>Diodes</a:t>
+            </a:r>
+          </a:p>
+        </p:txBody>
+      </p:sp>
+      <p:pic>
+        <p:nvPicPr>
+          <p:cNvPr id="6" name="Image 5">
+            <a:extLst>
+              <a:ext uri="{FF2B5EF4-FFF2-40B4-BE49-F238E27FC236}">
+                <a16:creationId xmlns:a16="http://schemas.microsoft.com/office/drawing/2014/main" id="{667BE185-EC55-8887-AC39-4B56D4E9D20F}"/>
+              </a:ext>
+            </a:extLst>
+          </p:cNvPr>
+          <p:cNvPicPr>
+            <a:picLocks noChangeAspect="1"/>
+          </p:cNvPicPr>
+          <p:nvPr/>
+        </p:nvPicPr>
+        <p:blipFill>
+          <a:blip r:embed="rId3"/>
+          <a:stretch>
+            <a:fillRect/>
+          </a:stretch>
+        </p:blipFill>
+        <p:spPr>
+          <a:xfrm>
+            <a:off x="6096000" y="2345728"/>
+            <a:ext cx="5125792" cy="4338536"/>
+          </a:xfrm>
+          <a:prstGeom prst="rect">
+            <a:avLst/>
+          </a:prstGeom>
+        </p:spPr>
+      </p:pic>
+    </p:spTree>
+    <p:extLst>
+      <p:ext uri="{BB962C8B-B14F-4D97-AF65-F5344CB8AC3E}">
+        <p14:creationId xmlns:p14="http://schemas.microsoft.com/office/powerpoint/2010/main" val="3666485358"/>
+      </p:ext>
+    </p:extLst>
+  </p:cSld>
+  <p:clrMapOvr>
+    <a:masterClrMapping/>
+  </p:clrMapOvr>
+</p:sld>
+</file>
+
+<file path=ppt/slides/slide5.xml><?xml version="1.0" encoding="utf-8"?>
+<p:sld xmlns:a="http://schemas.openxmlformats.org/drawingml/2006/main" xmlns:r="http://schemas.openxmlformats.org/officeDocument/2006/relationships" xmlns:p="http://schemas.openxmlformats.org/presentationml/2006/main">
+  <p:cSld>
+    <p:spTree>
+      <p:nvGrpSpPr>
+        <p:cNvPr id="1" name=""/>
+        <p:cNvGrpSpPr/>
+        <p:nvPr/>
+      </p:nvGrpSpPr>
+      <p:grpSpPr>
+        <a:xfrm>
+          <a:off x="0" y="0"/>
+          <a:ext cx="0" cy="0"/>
+          <a:chOff x="0" y="0"/>
+          <a:chExt cx="0" cy="0"/>
+        </a:xfrm>
+      </p:grpSpPr>
+      <p:sp>
+        <p:nvSpPr>
+          <p:cNvPr id="2" name="Titre 1">
+            <a:extLst>
+              <a:ext uri="{FF2B5EF4-FFF2-40B4-BE49-F238E27FC236}">
+                <a16:creationId xmlns:a16="http://schemas.microsoft.com/office/drawing/2014/main" id="{90162AE8-C1B0-5C56-8313-DEE494F38273}"/>
+              </a:ext>
+            </a:extLst>
+          </p:cNvPr>
+          <p:cNvSpPr>
+            <a:spLocks noGrp="1"/>
+          </p:cNvSpPr>
+          <p:nvPr>
+            <p:ph type="title"/>
+          </p:nvPr>
+        </p:nvSpPr>
+        <p:spPr/>
+        <p:txBody>
+          <a:bodyPr/>
+          <a:lstStyle/>
+          <a:p>
+            <a:r>
+              <a:rPr lang="fr-FR" dirty="0"/>
+              <a:t>M4 - Additionner des signaux</a:t>
+            </a:r>
+          </a:p>
+        </p:txBody>
+      </p:sp>
+      <p:pic>
+        <p:nvPicPr>
+          <p:cNvPr id="5" name="Image 4" descr="Une image contenant texte&#10;&#10;Description générée automatiquement">
+            <a:extLst>
+              <a:ext uri="{FF2B5EF4-FFF2-40B4-BE49-F238E27FC236}">
+                <a16:creationId xmlns:a16="http://schemas.microsoft.com/office/drawing/2014/main" id="{204ADC40-1D61-539F-22ED-6B21D67FBDE6}"/>
+              </a:ext>
+            </a:extLst>
+          </p:cNvPr>
+          <p:cNvPicPr>
+            <a:picLocks noChangeAspect="1"/>
+          </p:cNvPicPr>
+          <p:nvPr/>
+        </p:nvPicPr>
+        <p:blipFill>
+          <a:blip r:embed="rId2" cstate="print">
+            <a:extLst>
+              <a:ext uri="{28A0092B-C50C-407E-A947-70E740481C1C}">
+                <a14:useLocalDpi xmlns:a14="http://schemas.microsoft.com/office/drawing/2010/main" val="0"/>
+              </a:ext>
+            </a:extLst>
+          </a:blip>
+          <a:stretch>
+            <a:fillRect/>
+          </a:stretch>
+        </p:blipFill>
+        <p:spPr>
+          <a:xfrm>
+            <a:off x="202922" y="5934456"/>
+            <a:ext cx="1825291" cy="749808"/>
+          </a:xfrm>
+          <a:prstGeom prst="rect">
+            <a:avLst/>
+          </a:prstGeom>
+        </p:spPr>
+      </p:pic>
+      <p:sp>
+        <p:nvSpPr>
+          <p:cNvPr id="3" name="Espace réservé du contenu 2">
+            <a:extLst>
+              <a:ext uri="{FF2B5EF4-FFF2-40B4-BE49-F238E27FC236}">
+                <a16:creationId xmlns:a16="http://schemas.microsoft.com/office/drawing/2014/main" id="{0BEC7A2C-A17B-6386-59E3-FD868FE4C649}"/>
+              </a:ext>
+            </a:extLst>
+          </p:cNvPr>
+          <p:cNvSpPr>
+            <a:spLocks noGrp="1"/>
+          </p:cNvSpPr>
+          <p:nvPr>
+            <p:ph sz="half" idx="1"/>
+          </p:nvPr>
+        </p:nvSpPr>
+        <p:spPr>
+          <a:xfrm>
+            <a:off x="1115568" y="2478024"/>
+            <a:ext cx="5152710" cy="3694176"/>
+          </a:xfrm>
+        </p:spPr>
+        <p:txBody>
+          <a:bodyPr>
+            <a:normAutofit/>
+          </a:bodyPr>
+          <a:lstStyle/>
+          <a:p>
+            <a:pPr>
+              <a:buFont typeface="Arial" panose="020B0604020202020204" pitchFamily="34" charset="0"/>
+              <a:buChar char="•"/>
+            </a:pPr>
+            <a:r>
+              <a:rPr lang="fr-FR" dirty="0"/>
+              <a:t>ALI : montage additionneur</a:t>
+            </a:r>
+          </a:p>
+        </p:txBody>
+      </p:sp>
+      <p:pic>
+        <p:nvPicPr>
+          <p:cNvPr id="7" name="Image 6">
+            <a:extLst>
+              <a:ext uri="{FF2B5EF4-FFF2-40B4-BE49-F238E27FC236}">
+                <a16:creationId xmlns:a16="http://schemas.microsoft.com/office/drawing/2014/main" id="{B35D58F1-8865-34F3-CC12-3987DB61EB42}"/>
+              </a:ext>
+            </a:extLst>
+          </p:cNvPr>
+          <p:cNvPicPr>
+            <a:picLocks noChangeAspect="1"/>
+          </p:cNvPicPr>
+          <p:nvPr/>
+        </p:nvPicPr>
+        <p:blipFill>
+          <a:blip r:embed="rId3"/>
+          <a:stretch>
+            <a:fillRect/>
+          </a:stretch>
+        </p:blipFill>
+        <p:spPr>
+          <a:xfrm>
+            <a:off x="4874658" y="3325461"/>
+            <a:ext cx="5896436" cy="2983899"/>
+          </a:xfrm>
+          <a:prstGeom prst="rect">
+            <a:avLst/>
+          </a:prstGeom>
+        </p:spPr>
+      </p:pic>
+    </p:spTree>
+    <p:extLst>
+      <p:ext uri="{BB962C8B-B14F-4D97-AF65-F5344CB8AC3E}">
+        <p14:creationId xmlns:p14="http://schemas.microsoft.com/office/powerpoint/2010/main" val="2723905820"/>
+      </p:ext>
+    </p:extLst>
+  </p:cSld>
+  <p:clrMapOvr>
+    <a:masterClrMapping/>
+  </p:clrMapOvr>
+</p:sld>
+</file>
+
+<file path=ppt/slides/slide6.xml><?xml version="1.0" encoding="utf-8"?>
+<p:sld xmlns:a="http://schemas.openxmlformats.org/drawingml/2006/main" xmlns:r="http://schemas.openxmlformats.org/officeDocument/2006/relationships" xmlns:p="http://schemas.openxmlformats.org/presentationml/2006/main">
+  <p:cSld>
+    <p:spTree>
+      <p:nvGrpSpPr>
+        <p:cNvPr id="1" name=""/>
+        <p:cNvGrpSpPr/>
+        <p:nvPr/>
+      </p:nvGrpSpPr>
+      <p:grpSpPr>
+        <a:xfrm>
+          <a:off x="0" y="0"/>
+          <a:ext cx="0" cy="0"/>
+          <a:chOff x="0" y="0"/>
+          <a:chExt cx="0" cy="0"/>
+        </a:xfrm>
+      </p:grpSpPr>
+      <p:pic>
+        <p:nvPicPr>
+          <p:cNvPr id="6" name="Image 5">
+            <a:extLst>
+              <a:ext uri="{FF2B5EF4-FFF2-40B4-BE49-F238E27FC236}">
+                <a16:creationId xmlns:a16="http://schemas.microsoft.com/office/drawing/2014/main" id="{71DBEBC0-4D80-CE59-B409-8C5565A7CB04}"/>
+              </a:ext>
+            </a:extLst>
+          </p:cNvPr>
+          <p:cNvPicPr>
+            <a:picLocks noChangeAspect="1"/>
+          </p:cNvPicPr>
+          <p:nvPr/>
+        </p:nvPicPr>
+        <p:blipFill>
+          <a:blip r:embed="rId2"/>
+          <a:stretch>
+            <a:fillRect/>
+          </a:stretch>
+        </p:blipFill>
+        <p:spPr>
+          <a:xfrm>
+            <a:off x="3015190" y="2838092"/>
+            <a:ext cx="8331468" cy="3540968"/>
+          </a:xfrm>
+          <a:prstGeom prst="rect">
+            <a:avLst/>
+          </a:prstGeom>
+        </p:spPr>
+      </p:pic>
+      <p:sp>
+        <p:nvSpPr>
+          <p:cNvPr id="2" name="Titre 1">
+            <a:extLst>
+              <a:ext uri="{FF2B5EF4-FFF2-40B4-BE49-F238E27FC236}">
+                <a16:creationId xmlns:a16="http://schemas.microsoft.com/office/drawing/2014/main" id="{90162AE8-C1B0-5C56-8313-DEE494F38273}"/>
+              </a:ext>
+            </a:extLst>
+          </p:cNvPr>
+          <p:cNvSpPr>
+            <a:spLocks noGrp="1"/>
+          </p:cNvSpPr>
+          <p:nvPr>
+            <p:ph type="title"/>
+          </p:nvPr>
+        </p:nvSpPr>
+        <p:spPr/>
+        <p:txBody>
+          <a:bodyPr>
+            <a:normAutofit fontScale="90000"/>
+          </a:bodyPr>
+          <a:lstStyle/>
+          <a:p>
+            <a:r>
+              <a:rPr lang="fr-FR" dirty="0"/>
+              <a:t>M5 - Mettre en forme un capteur de température</a:t>
+            </a:r>
+          </a:p>
+        </p:txBody>
+      </p:sp>
+      <p:pic>
+        <p:nvPicPr>
+          <p:cNvPr id="5" name="Image 4" descr="Une image contenant texte&#10;&#10;Description générée automatiquement">
+            <a:extLst>
+              <a:ext uri="{FF2B5EF4-FFF2-40B4-BE49-F238E27FC236}">
+                <a16:creationId xmlns:a16="http://schemas.microsoft.com/office/drawing/2014/main" id="{204ADC40-1D61-539F-22ED-6B21D67FBDE6}"/>
+              </a:ext>
+            </a:extLst>
+          </p:cNvPr>
+          <p:cNvPicPr>
+            <a:picLocks noChangeAspect="1"/>
+          </p:cNvPicPr>
+          <p:nvPr/>
+        </p:nvPicPr>
+        <p:blipFill>
+          <a:blip r:embed="rId3" cstate="print">
+            <a:extLst>
+              <a:ext uri="{28A0092B-C50C-407E-A947-70E740481C1C}">
+                <a14:useLocalDpi xmlns:a14="http://schemas.microsoft.com/office/drawing/2010/main" val="0"/>
+              </a:ext>
+            </a:extLst>
+          </a:blip>
+          <a:stretch>
+            <a:fillRect/>
+          </a:stretch>
+        </p:blipFill>
+        <p:spPr>
+          <a:xfrm>
+            <a:off x="202922" y="5934456"/>
+            <a:ext cx="1825291" cy="749808"/>
+          </a:xfrm>
+          <a:prstGeom prst="rect">
+            <a:avLst/>
+          </a:prstGeom>
+        </p:spPr>
+      </p:pic>
+      <p:sp>
+        <p:nvSpPr>
+          <p:cNvPr id="3" name="Espace réservé du contenu 2">
+            <a:extLst>
+              <a:ext uri="{FF2B5EF4-FFF2-40B4-BE49-F238E27FC236}">
+                <a16:creationId xmlns:a16="http://schemas.microsoft.com/office/drawing/2014/main" id="{0BEC7A2C-A17B-6386-59E3-FD868FE4C649}"/>
+              </a:ext>
+            </a:extLst>
+          </p:cNvPr>
+          <p:cNvSpPr>
+            <a:spLocks noGrp="1"/>
+          </p:cNvSpPr>
+          <p:nvPr>
+            <p:ph sz="half" idx="1"/>
+          </p:nvPr>
+        </p:nvSpPr>
+        <p:spPr>
+          <a:xfrm>
+            <a:off x="1115568" y="2478024"/>
+            <a:ext cx="5152710" cy="3694176"/>
+          </a:xfrm>
+        </p:spPr>
+        <p:txBody>
+          <a:bodyPr>
+            <a:normAutofit/>
+          </a:bodyPr>
+          <a:lstStyle/>
+          <a:p>
+            <a:pPr>
+              <a:buFont typeface="Arial" panose="020B0604020202020204" pitchFamily="34" charset="0"/>
+              <a:buChar char="•"/>
+            </a:pPr>
+            <a:r>
+              <a:rPr lang="fr-FR" dirty="0"/>
+              <a:t>Mise en forme</a:t>
+            </a:r>
+          </a:p>
+        </p:txBody>
+      </p:sp>
+    </p:spTree>
+    <p:extLst>
+      <p:ext uri="{BB962C8B-B14F-4D97-AF65-F5344CB8AC3E}">
+        <p14:creationId xmlns:p14="http://schemas.microsoft.com/office/powerpoint/2010/main" val="88325886"/>
       </p:ext>
     </p:extLst>
   </p:cSld>

</xml_diff>

<commit_message>
Update CeTI / Bloc 1 - Final Version
</commit_message>
<xml_diff>
--- a/CeTI/b1_capteurs/B1_1_capteurs.pptx
+++ b/CeTI/b1_capteurs/B1_1_capteurs.pptx
@@ -213,7 +213,7 @@
           <a:p>
             <a:fld id="{729C724E-499D-43AC-8699-CF969D2466FC}" type="datetimeFigureOut">
               <a:rPr lang="fr-FR" smtClean="0"/>
-              <a:t>20/07/2023</a:t>
+              <a:t>30/08/2023</a:t>
             </a:fld>
             <a:endParaRPr lang="fr-FR"/>
           </a:p>
@@ -636,7 +636,7 @@
           <a:p>
             <a:fld id="{02AC24A9-CCB6-4F8D-B8DB-C2F3692CFA5A}" type="datetimeFigureOut">
               <a:rPr lang="en-US" smtClean="0"/>
-              <a:t>7/20/2023</a:t>
+              <a:t>8/30/2023</a:t>
             </a:fld>
             <a:endParaRPr lang="en-US" dirty="0"/>
           </a:p>
@@ -1006,7 +1006,7 @@
           <a:p>
             <a:fld id="{02AC24A9-CCB6-4F8D-B8DB-C2F3692CFA5A}" type="datetimeFigureOut">
               <a:rPr lang="en-US" smtClean="0"/>
-              <a:t>7/20/2023</a:t>
+              <a:t>8/30/2023</a:t>
             </a:fld>
             <a:endParaRPr lang="en-US"/>
           </a:p>
@@ -1215,7 +1215,7 @@
           <a:p>
             <a:fld id="{02AC24A9-CCB6-4F8D-B8DB-C2F3692CFA5A}" type="datetimeFigureOut">
               <a:rPr lang="en-US" smtClean="0"/>
-              <a:t>7/20/2023</a:t>
+              <a:t>8/30/2023</a:t>
             </a:fld>
             <a:endParaRPr lang="en-US"/>
           </a:p>
@@ -1685,7 +1685,7 @@
           <a:p>
             <a:fld id="{02AC24A9-CCB6-4F8D-B8DB-C2F3692CFA5A}" type="datetimeFigureOut">
               <a:rPr lang="en-US" smtClean="0"/>
-              <a:t>7/20/2023</a:t>
+              <a:t>8/30/2023</a:t>
             </a:fld>
             <a:endParaRPr lang="en-US"/>
           </a:p>
@@ -2139,7 +2139,7 @@
           <a:p>
             <a:fld id="{02AC24A9-CCB6-4F8D-B8DB-C2F3692CFA5A}" type="datetimeFigureOut">
               <a:rPr lang="en-US" smtClean="0"/>
-              <a:t>7/20/2023</a:t>
+              <a:t>8/30/2023</a:t>
             </a:fld>
             <a:endParaRPr lang="en-US"/>
           </a:p>
@@ -2671,7 +2671,7 @@
           <a:p>
             <a:fld id="{02AC24A9-CCB6-4F8D-B8DB-C2F3692CFA5A}" type="datetimeFigureOut">
               <a:rPr lang="en-US" smtClean="0"/>
-              <a:t>7/20/2023</a:t>
+              <a:t>8/30/2023</a:t>
             </a:fld>
             <a:endParaRPr lang="en-US"/>
           </a:p>
@@ -3370,7 +3370,7 @@
           <a:p>
             <a:fld id="{02AC24A9-CCB6-4F8D-B8DB-C2F3692CFA5A}" type="datetimeFigureOut">
               <a:rPr lang="en-US" smtClean="0"/>
-              <a:t>7/20/2023</a:t>
+              <a:t>8/30/2023</a:t>
             </a:fld>
             <a:endParaRPr lang="en-US"/>
           </a:p>
@@ -3699,7 +3699,7 @@
           <a:p>
             <a:fld id="{02AC24A9-CCB6-4F8D-B8DB-C2F3692CFA5A}" type="datetimeFigureOut">
               <a:rPr lang="en-US" smtClean="0"/>
-              <a:t>7/20/2023</a:t>
+              <a:t>8/30/2023</a:t>
             </a:fld>
             <a:endParaRPr lang="en-US"/>
           </a:p>
@@ -3812,7 +3812,7 @@
           <a:p>
             <a:fld id="{02AC24A9-CCB6-4F8D-B8DB-C2F3692CFA5A}" type="datetimeFigureOut">
               <a:rPr lang="en-US" smtClean="0"/>
-              <a:t>7/20/2023</a:t>
+              <a:t>8/30/2023</a:t>
             </a:fld>
             <a:endParaRPr lang="en-US"/>
           </a:p>
@@ -4307,7 +4307,7 @@
           <a:p>
             <a:fld id="{02AC24A9-CCB6-4F8D-B8DB-C2F3692CFA5A}" type="datetimeFigureOut">
               <a:rPr lang="en-US" smtClean="0"/>
-              <a:t>7/20/2023</a:t>
+              <a:t>8/30/2023</a:t>
             </a:fld>
             <a:endParaRPr lang="en-US" dirty="0"/>
           </a:p>
@@ -4784,7 +4784,7 @@
           <a:p>
             <a:fld id="{02AC24A9-CCB6-4F8D-B8DB-C2F3692CFA5A}" type="datetimeFigureOut">
               <a:rPr lang="en-US" smtClean="0"/>
-              <a:t>7/20/2023</a:t>
+              <a:t>8/30/2023</a:t>
             </a:fld>
             <a:endParaRPr lang="en-US"/>
           </a:p>
@@ -5027,7 +5027,7 @@
           <a:p>
             <a:fld id="{02AC24A9-CCB6-4F8D-B8DB-C2F3692CFA5A}" type="datetimeFigureOut">
               <a:rPr lang="en-US" smtClean="0"/>
-              <a:t>7/20/2023</a:t>
+              <a:t>8/30/2023</a:t>
             </a:fld>
             <a:endParaRPr lang="en-US"/>
           </a:p>
@@ -7450,10 +7450,10 @@
       </p:sp>
       <p:pic>
         <p:nvPicPr>
-          <p:cNvPr id="6" name="Image 5">
-            <a:extLst>
-              <a:ext uri="{FF2B5EF4-FFF2-40B4-BE49-F238E27FC236}">
-                <a16:creationId xmlns:a16="http://schemas.microsoft.com/office/drawing/2014/main" id="{667BE185-EC55-8887-AC39-4B56D4E9D20F}"/>
+          <p:cNvPr id="11" name="Image 10">
+            <a:extLst>
+              <a:ext uri="{FF2B5EF4-FFF2-40B4-BE49-F238E27FC236}">
+                <a16:creationId xmlns:a16="http://schemas.microsoft.com/office/drawing/2014/main" id="{53E358D8-B69A-56BE-8E7D-78F5258C4662}"/>
               </a:ext>
             </a:extLst>
           </p:cNvPr>
@@ -7470,8 +7470,8 @@
         </p:blipFill>
         <p:spPr>
           <a:xfrm>
-            <a:off x="6096000" y="2345728"/>
-            <a:ext cx="5125792" cy="4338536"/>
+            <a:off x="3691923" y="2364264"/>
+            <a:ext cx="7776000" cy="4320000"/>
           </a:xfrm>
           <a:prstGeom prst="rect">
             <a:avLst/>

</xml_diff>

<commit_message>
Update CeTI - Bloc 1
</commit_message>
<xml_diff>
--- a/CeTI/b1_capteurs/B1_1_capteurs.pptx
+++ b/CeTI/b1_capteurs/B1_1_capteurs.pptx
@@ -5,15 +5,20 @@
     <p:sldMasterId id="2147483711" r:id="rId1"/>
   </p:sldMasterIdLst>
   <p:notesMasterIdLst>
-    <p:notesMasterId r:id="rId8"/>
+    <p:notesMasterId r:id="rId13"/>
   </p:notesMasterIdLst>
   <p:sldIdLst>
     <p:sldId id="256" r:id="rId2"/>
     <p:sldId id="272" r:id="rId3"/>
     <p:sldId id="273" r:id="rId4"/>
     <p:sldId id="274" r:id="rId5"/>
-    <p:sldId id="275" r:id="rId6"/>
-    <p:sldId id="276" r:id="rId7"/>
+    <p:sldId id="278" r:id="rId6"/>
+    <p:sldId id="277" r:id="rId7"/>
+    <p:sldId id="279" r:id="rId8"/>
+    <p:sldId id="275" r:id="rId9"/>
+    <p:sldId id="276" r:id="rId10"/>
+    <p:sldId id="280" r:id="rId11"/>
+    <p:sldId id="281" r:id="rId12"/>
   </p:sldIdLst>
   <p:sldSz cx="12192000" cy="6858000"/>
   <p:notesSz cx="6858000" cy="9144000"/>
@@ -213,7 +218,7 @@
           <a:p>
             <a:fld id="{729C724E-499D-43AC-8699-CF969D2466FC}" type="datetimeFigureOut">
               <a:rPr lang="fr-FR" smtClean="0"/>
-              <a:t>30/08/2023</a:t>
+              <a:t>16/09/2023</a:t>
             </a:fld>
             <a:endParaRPr lang="fr-FR"/>
           </a:p>
@@ -636,7 +641,7 @@
           <a:p>
             <a:fld id="{02AC24A9-CCB6-4F8D-B8DB-C2F3692CFA5A}" type="datetimeFigureOut">
               <a:rPr lang="en-US" smtClean="0"/>
-              <a:t>8/30/2023</a:t>
+              <a:t>9/16/2023</a:t>
             </a:fld>
             <a:endParaRPr lang="en-US" dirty="0"/>
           </a:p>
@@ -1006,7 +1011,7 @@
           <a:p>
             <a:fld id="{02AC24A9-CCB6-4F8D-B8DB-C2F3692CFA5A}" type="datetimeFigureOut">
               <a:rPr lang="en-US" smtClean="0"/>
-              <a:t>8/30/2023</a:t>
+              <a:t>9/16/2023</a:t>
             </a:fld>
             <a:endParaRPr lang="en-US"/>
           </a:p>
@@ -1215,7 +1220,7 @@
           <a:p>
             <a:fld id="{02AC24A9-CCB6-4F8D-B8DB-C2F3692CFA5A}" type="datetimeFigureOut">
               <a:rPr lang="en-US" smtClean="0"/>
-              <a:t>8/30/2023</a:t>
+              <a:t>9/16/2023</a:t>
             </a:fld>
             <a:endParaRPr lang="en-US"/>
           </a:p>
@@ -1685,7 +1690,7 @@
           <a:p>
             <a:fld id="{02AC24A9-CCB6-4F8D-B8DB-C2F3692CFA5A}" type="datetimeFigureOut">
               <a:rPr lang="en-US" smtClean="0"/>
-              <a:t>8/30/2023</a:t>
+              <a:t>9/16/2023</a:t>
             </a:fld>
             <a:endParaRPr lang="en-US"/>
           </a:p>
@@ -2139,7 +2144,7 @@
           <a:p>
             <a:fld id="{02AC24A9-CCB6-4F8D-B8DB-C2F3692CFA5A}" type="datetimeFigureOut">
               <a:rPr lang="en-US" smtClean="0"/>
-              <a:t>8/30/2023</a:t>
+              <a:t>9/16/2023</a:t>
             </a:fld>
             <a:endParaRPr lang="en-US"/>
           </a:p>
@@ -2671,7 +2676,7 @@
           <a:p>
             <a:fld id="{02AC24A9-CCB6-4F8D-B8DB-C2F3692CFA5A}" type="datetimeFigureOut">
               <a:rPr lang="en-US" smtClean="0"/>
-              <a:t>8/30/2023</a:t>
+              <a:t>9/16/2023</a:t>
             </a:fld>
             <a:endParaRPr lang="en-US"/>
           </a:p>
@@ -3370,7 +3375,7 @@
           <a:p>
             <a:fld id="{02AC24A9-CCB6-4F8D-B8DB-C2F3692CFA5A}" type="datetimeFigureOut">
               <a:rPr lang="en-US" smtClean="0"/>
-              <a:t>8/30/2023</a:t>
+              <a:t>9/16/2023</a:t>
             </a:fld>
             <a:endParaRPr lang="en-US"/>
           </a:p>
@@ -3699,7 +3704,7 @@
           <a:p>
             <a:fld id="{02AC24A9-CCB6-4F8D-B8DB-C2F3692CFA5A}" type="datetimeFigureOut">
               <a:rPr lang="en-US" smtClean="0"/>
-              <a:t>8/30/2023</a:t>
+              <a:t>9/16/2023</a:t>
             </a:fld>
             <a:endParaRPr lang="en-US"/>
           </a:p>
@@ -3812,7 +3817,7 @@
           <a:p>
             <a:fld id="{02AC24A9-CCB6-4F8D-B8DB-C2F3692CFA5A}" type="datetimeFigureOut">
               <a:rPr lang="en-US" smtClean="0"/>
-              <a:t>8/30/2023</a:t>
+              <a:t>9/16/2023</a:t>
             </a:fld>
             <a:endParaRPr lang="en-US"/>
           </a:p>
@@ -4307,7 +4312,7 @@
           <a:p>
             <a:fld id="{02AC24A9-CCB6-4F8D-B8DB-C2F3692CFA5A}" type="datetimeFigureOut">
               <a:rPr lang="en-US" smtClean="0"/>
-              <a:t>8/30/2023</a:t>
+              <a:t>9/16/2023</a:t>
             </a:fld>
             <a:endParaRPr lang="en-US" dirty="0"/>
           </a:p>
@@ -4784,7 +4789,7 @@
           <a:p>
             <a:fld id="{02AC24A9-CCB6-4F8D-B8DB-C2F3692CFA5A}" type="datetimeFigureOut">
               <a:rPr lang="en-US" smtClean="0"/>
-              <a:t>8/30/2023</a:t>
+              <a:t>9/16/2023</a:t>
             </a:fld>
             <a:endParaRPr lang="en-US"/>
           </a:p>
@@ -5027,7 +5032,7 @@
           <a:p>
             <a:fld id="{02AC24A9-CCB6-4F8D-B8DB-C2F3692CFA5A}" type="datetimeFigureOut">
               <a:rPr lang="en-US" smtClean="0"/>
-              <a:t>8/30/2023</a:t>
+              <a:t>9/16/2023</a:t>
             </a:fld>
             <a:endParaRPr lang="en-US"/>
           </a:p>
@@ -5947,6 +5952,396 @@
 </p:sld>
 </file>
 
+<file path=ppt/slides/slide10.xml><?xml version="1.0" encoding="utf-8"?>
+<p:sld xmlns:a="http://schemas.openxmlformats.org/drawingml/2006/main" xmlns:r="http://schemas.openxmlformats.org/officeDocument/2006/relationships" xmlns:p="http://schemas.openxmlformats.org/presentationml/2006/main">
+  <p:cSld>
+    <p:spTree>
+      <p:nvGrpSpPr>
+        <p:cNvPr id="1" name=""/>
+        <p:cNvGrpSpPr/>
+        <p:nvPr/>
+      </p:nvGrpSpPr>
+      <p:grpSpPr>
+        <a:xfrm>
+          <a:off x="0" y="0"/>
+          <a:ext cx="0" cy="0"/>
+          <a:chOff x="0" y="0"/>
+          <a:chExt cx="0" cy="0"/>
+        </a:xfrm>
+      </p:grpSpPr>
+      <p:sp>
+        <p:nvSpPr>
+          <p:cNvPr id="2" name="Titre 1">
+            <a:extLst>
+              <a:ext uri="{FF2B5EF4-FFF2-40B4-BE49-F238E27FC236}">
+                <a16:creationId xmlns:a16="http://schemas.microsoft.com/office/drawing/2014/main" id="{90162AE8-C1B0-5C56-8313-DEE494F38273}"/>
+              </a:ext>
+            </a:extLst>
+          </p:cNvPr>
+          <p:cNvSpPr>
+            <a:spLocks noGrp="1"/>
+          </p:cNvSpPr>
+          <p:nvPr>
+            <p:ph type="title"/>
+          </p:nvPr>
+        </p:nvSpPr>
+        <p:spPr/>
+        <p:txBody>
+          <a:bodyPr>
+            <a:normAutofit fontScale="90000"/>
+          </a:bodyPr>
+          <a:lstStyle/>
+          <a:p>
+            <a:r>
+              <a:rPr lang="fr-FR" dirty="0"/>
+              <a:t>M6 - Mettre en forme un capteur de température</a:t>
+            </a:r>
+          </a:p>
+        </p:txBody>
+      </p:sp>
+      <p:pic>
+        <p:nvPicPr>
+          <p:cNvPr id="5" name="Image 4" descr="Une image contenant texte&#10;&#10;Description générée automatiquement">
+            <a:extLst>
+              <a:ext uri="{FF2B5EF4-FFF2-40B4-BE49-F238E27FC236}">
+                <a16:creationId xmlns:a16="http://schemas.microsoft.com/office/drawing/2014/main" id="{204ADC40-1D61-539F-22ED-6B21D67FBDE6}"/>
+              </a:ext>
+            </a:extLst>
+          </p:cNvPr>
+          <p:cNvPicPr>
+            <a:picLocks noChangeAspect="1"/>
+          </p:cNvPicPr>
+          <p:nvPr/>
+        </p:nvPicPr>
+        <p:blipFill>
+          <a:blip r:embed="rId2" cstate="print">
+            <a:extLst>
+              <a:ext uri="{28A0092B-C50C-407E-A947-70E740481C1C}">
+                <a14:useLocalDpi xmlns:a14="http://schemas.microsoft.com/office/drawing/2010/main" val="0"/>
+              </a:ext>
+            </a:extLst>
+          </a:blip>
+          <a:stretch>
+            <a:fillRect/>
+          </a:stretch>
+        </p:blipFill>
+        <p:spPr>
+          <a:xfrm>
+            <a:off x="202922" y="5934456"/>
+            <a:ext cx="1825291" cy="749808"/>
+          </a:xfrm>
+          <a:prstGeom prst="rect">
+            <a:avLst/>
+          </a:prstGeom>
+        </p:spPr>
+      </p:pic>
+      <p:sp>
+        <p:nvSpPr>
+          <p:cNvPr id="3" name="Espace réservé du contenu 2">
+            <a:extLst>
+              <a:ext uri="{FF2B5EF4-FFF2-40B4-BE49-F238E27FC236}">
+                <a16:creationId xmlns:a16="http://schemas.microsoft.com/office/drawing/2014/main" id="{0BEC7A2C-A17B-6386-59E3-FD868FE4C649}"/>
+              </a:ext>
+            </a:extLst>
+          </p:cNvPr>
+          <p:cNvSpPr>
+            <a:spLocks noGrp="1"/>
+          </p:cNvSpPr>
+          <p:nvPr>
+            <p:ph sz="half" idx="1"/>
+          </p:nvPr>
+        </p:nvSpPr>
+        <p:spPr>
+          <a:xfrm>
+            <a:off x="1115568" y="2478024"/>
+            <a:ext cx="5152710" cy="3694176"/>
+          </a:xfrm>
+        </p:spPr>
+        <p:txBody>
+          <a:bodyPr>
+            <a:normAutofit/>
+          </a:bodyPr>
+          <a:lstStyle/>
+          <a:p>
+            <a:pPr>
+              <a:buFont typeface="Arial" panose="020B0604020202020204" pitchFamily="34" charset="0"/>
+              <a:buChar char="•"/>
+            </a:pPr>
+            <a:r>
+              <a:rPr lang="fr-FR" dirty="0"/>
+              <a:t>Diode Zener</a:t>
+            </a:r>
+          </a:p>
+        </p:txBody>
+      </p:sp>
+      <p:pic>
+        <p:nvPicPr>
+          <p:cNvPr id="7" name="Image 6">
+            <a:extLst>
+              <a:ext uri="{FF2B5EF4-FFF2-40B4-BE49-F238E27FC236}">
+                <a16:creationId xmlns:a16="http://schemas.microsoft.com/office/drawing/2014/main" id="{49D8AC4F-08F3-4833-EEE0-B3C173C61B2D}"/>
+              </a:ext>
+            </a:extLst>
+          </p:cNvPr>
+          <p:cNvPicPr>
+            <a:picLocks noChangeAspect="1"/>
+          </p:cNvPicPr>
+          <p:nvPr/>
+        </p:nvPicPr>
+        <p:blipFill>
+          <a:blip r:embed="rId3"/>
+          <a:stretch>
+            <a:fillRect/>
+          </a:stretch>
+        </p:blipFill>
+        <p:spPr>
+          <a:xfrm>
+            <a:off x="7551824" y="2235433"/>
+            <a:ext cx="3996828" cy="4178068"/>
+          </a:xfrm>
+          <a:prstGeom prst="rect">
+            <a:avLst/>
+          </a:prstGeom>
+        </p:spPr>
+      </p:pic>
+      <p:pic>
+        <p:nvPicPr>
+          <p:cNvPr id="9" name="Image 8">
+            <a:extLst>
+              <a:ext uri="{FF2B5EF4-FFF2-40B4-BE49-F238E27FC236}">
+                <a16:creationId xmlns:a16="http://schemas.microsoft.com/office/drawing/2014/main" id="{ABCF384E-915A-1920-D403-7E8DDA61AC2E}"/>
+              </a:ext>
+            </a:extLst>
+          </p:cNvPr>
+          <p:cNvPicPr>
+            <a:picLocks noChangeAspect="1"/>
+          </p:cNvPicPr>
+          <p:nvPr/>
+        </p:nvPicPr>
+        <p:blipFill>
+          <a:blip r:embed="rId4"/>
+          <a:stretch>
+            <a:fillRect/>
+          </a:stretch>
+        </p:blipFill>
+        <p:spPr>
+          <a:xfrm>
+            <a:off x="3595280" y="3790885"/>
+            <a:ext cx="2080440" cy="1486029"/>
+          </a:xfrm>
+          <a:prstGeom prst="rect">
+            <a:avLst/>
+          </a:prstGeom>
+        </p:spPr>
+      </p:pic>
+    </p:spTree>
+    <p:extLst>
+      <p:ext uri="{BB962C8B-B14F-4D97-AF65-F5344CB8AC3E}">
+        <p14:creationId xmlns:p14="http://schemas.microsoft.com/office/powerpoint/2010/main" val="3175047365"/>
+      </p:ext>
+    </p:extLst>
+  </p:cSld>
+  <p:clrMapOvr>
+    <a:masterClrMapping/>
+  </p:clrMapOvr>
+</p:sld>
+</file>
+
+<file path=ppt/slides/slide11.xml><?xml version="1.0" encoding="utf-8"?>
+<p:sld xmlns:a="http://schemas.openxmlformats.org/drawingml/2006/main" xmlns:r="http://schemas.openxmlformats.org/officeDocument/2006/relationships" xmlns:p="http://schemas.openxmlformats.org/presentationml/2006/main">
+  <p:cSld>
+    <p:spTree>
+      <p:nvGrpSpPr>
+        <p:cNvPr id="1" name=""/>
+        <p:cNvGrpSpPr/>
+        <p:nvPr/>
+      </p:nvGrpSpPr>
+      <p:grpSpPr>
+        <a:xfrm>
+          <a:off x="0" y="0"/>
+          <a:ext cx="0" cy="0"/>
+          <a:chOff x="0" y="0"/>
+          <a:chExt cx="0" cy="0"/>
+        </a:xfrm>
+      </p:grpSpPr>
+      <p:sp>
+        <p:nvSpPr>
+          <p:cNvPr id="2" name="Titre 1">
+            <a:extLst>
+              <a:ext uri="{FF2B5EF4-FFF2-40B4-BE49-F238E27FC236}">
+                <a16:creationId xmlns:a16="http://schemas.microsoft.com/office/drawing/2014/main" id="{90162AE8-C1B0-5C56-8313-DEE494F38273}"/>
+              </a:ext>
+            </a:extLst>
+          </p:cNvPr>
+          <p:cNvSpPr>
+            <a:spLocks noGrp="1"/>
+          </p:cNvSpPr>
+          <p:nvPr>
+            <p:ph type="title"/>
+          </p:nvPr>
+        </p:nvSpPr>
+        <p:spPr/>
+        <p:txBody>
+          <a:bodyPr>
+            <a:normAutofit fontScale="90000"/>
+          </a:bodyPr>
+          <a:lstStyle/>
+          <a:p>
+            <a:r>
+              <a:rPr lang="fr-FR" dirty="0"/>
+              <a:t>M6 - Mettre en forme un capteur de température</a:t>
+            </a:r>
+          </a:p>
+        </p:txBody>
+      </p:sp>
+      <p:pic>
+        <p:nvPicPr>
+          <p:cNvPr id="5" name="Image 4" descr="Une image contenant texte&#10;&#10;Description générée automatiquement">
+            <a:extLst>
+              <a:ext uri="{FF2B5EF4-FFF2-40B4-BE49-F238E27FC236}">
+                <a16:creationId xmlns:a16="http://schemas.microsoft.com/office/drawing/2014/main" id="{204ADC40-1D61-539F-22ED-6B21D67FBDE6}"/>
+              </a:ext>
+            </a:extLst>
+          </p:cNvPr>
+          <p:cNvPicPr>
+            <a:picLocks noChangeAspect="1"/>
+          </p:cNvPicPr>
+          <p:nvPr/>
+        </p:nvPicPr>
+        <p:blipFill>
+          <a:blip r:embed="rId2" cstate="print">
+            <a:extLst>
+              <a:ext uri="{28A0092B-C50C-407E-A947-70E740481C1C}">
+                <a14:useLocalDpi xmlns:a14="http://schemas.microsoft.com/office/drawing/2010/main" val="0"/>
+              </a:ext>
+            </a:extLst>
+          </a:blip>
+          <a:stretch>
+            <a:fillRect/>
+          </a:stretch>
+        </p:blipFill>
+        <p:spPr>
+          <a:xfrm>
+            <a:off x="202922" y="5934456"/>
+            <a:ext cx="1825291" cy="749808"/>
+          </a:xfrm>
+          <a:prstGeom prst="rect">
+            <a:avLst/>
+          </a:prstGeom>
+        </p:spPr>
+      </p:pic>
+      <p:sp>
+        <p:nvSpPr>
+          <p:cNvPr id="3" name="Espace réservé du contenu 2">
+            <a:extLst>
+              <a:ext uri="{FF2B5EF4-FFF2-40B4-BE49-F238E27FC236}">
+                <a16:creationId xmlns:a16="http://schemas.microsoft.com/office/drawing/2014/main" id="{0BEC7A2C-A17B-6386-59E3-FD868FE4C649}"/>
+              </a:ext>
+            </a:extLst>
+          </p:cNvPr>
+          <p:cNvSpPr>
+            <a:spLocks noGrp="1"/>
+          </p:cNvSpPr>
+          <p:nvPr>
+            <p:ph sz="half" idx="1"/>
+          </p:nvPr>
+        </p:nvSpPr>
+        <p:spPr>
+          <a:xfrm>
+            <a:off x="1115568" y="2478024"/>
+            <a:ext cx="5152710" cy="3694176"/>
+          </a:xfrm>
+        </p:spPr>
+        <p:txBody>
+          <a:bodyPr>
+            <a:normAutofit/>
+          </a:bodyPr>
+          <a:lstStyle/>
+          <a:p>
+            <a:pPr>
+              <a:buFont typeface="Arial" panose="020B0604020202020204" pitchFamily="34" charset="0"/>
+              <a:buChar char="•"/>
+            </a:pPr>
+            <a:r>
+              <a:rPr lang="fr-FR" dirty="0"/>
+              <a:t>Régulation</a:t>
+            </a:r>
+          </a:p>
+        </p:txBody>
+      </p:sp>
+      <p:pic>
+        <p:nvPicPr>
+          <p:cNvPr id="7" name="Image 6">
+            <a:extLst>
+              <a:ext uri="{FF2B5EF4-FFF2-40B4-BE49-F238E27FC236}">
+                <a16:creationId xmlns:a16="http://schemas.microsoft.com/office/drawing/2014/main" id="{49D8AC4F-08F3-4833-EEE0-B3C173C61B2D}"/>
+              </a:ext>
+            </a:extLst>
+          </p:cNvPr>
+          <p:cNvPicPr>
+            <a:picLocks noChangeAspect="1"/>
+          </p:cNvPicPr>
+          <p:nvPr/>
+        </p:nvPicPr>
+        <p:blipFill>
+          <a:blip r:embed="rId3"/>
+          <a:stretch>
+            <a:fillRect/>
+          </a:stretch>
+        </p:blipFill>
+        <p:spPr>
+          <a:xfrm>
+            <a:off x="9058312" y="2235433"/>
+            <a:ext cx="2490340" cy="2603267"/>
+          </a:xfrm>
+          <a:prstGeom prst="rect">
+            <a:avLst/>
+          </a:prstGeom>
+        </p:spPr>
+      </p:pic>
+      <p:pic>
+        <p:nvPicPr>
+          <p:cNvPr id="6" name="Image 5">
+            <a:extLst>
+              <a:ext uri="{FF2B5EF4-FFF2-40B4-BE49-F238E27FC236}">
+                <a16:creationId xmlns:a16="http://schemas.microsoft.com/office/drawing/2014/main" id="{B77AB464-0B8A-D52C-B18F-AC27511DFE05}"/>
+              </a:ext>
+            </a:extLst>
+          </p:cNvPr>
+          <p:cNvPicPr>
+            <a:picLocks noChangeAspect="1"/>
+          </p:cNvPicPr>
+          <p:nvPr/>
+        </p:nvPicPr>
+        <p:blipFill>
+          <a:blip r:embed="rId4"/>
+          <a:stretch>
+            <a:fillRect/>
+          </a:stretch>
+        </p:blipFill>
+        <p:spPr>
+          <a:xfrm>
+            <a:off x="4231273" y="2235433"/>
+            <a:ext cx="4620627" cy="4272286"/>
+          </a:xfrm>
+          <a:prstGeom prst="rect">
+            <a:avLst/>
+          </a:prstGeom>
+        </p:spPr>
+      </p:pic>
+    </p:spTree>
+    <p:extLst>
+      <p:ext uri="{BB962C8B-B14F-4D97-AF65-F5344CB8AC3E}">
+        <p14:creationId xmlns:p14="http://schemas.microsoft.com/office/powerpoint/2010/main" val="1724691501"/>
+      </p:ext>
+    </p:extLst>
+  </p:cSld>
+  <p:clrMapOvr>
+    <a:masterClrMapping/>
+  </p:clrMapOvr>
+</p:sld>
+</file>
+
 <file path=ppt/slides/slide2.xml><?xml version="1.0" encoding="utf-8"?>
 <p:sld xmlns:a="http://schemas.openxmlformats.org/drawingml/2006/main" xmlns:r="http://schemas.openxmlformats.org/officeDocument/2006/relationships" xmlns:p="http://schemas.openxmlformats.org/presentationml/2006/main">
   <p:cSld>
@@ -7368,7 +7763,7 @@
           <a:p>
             <a:r>
               <a:rPr lang="fr-FR" dirty="0"/>
-              <a:t>M3 - Limiter une tension</a:t>
+              <a:t>M1 – Abaisser une tension</a:t>
             </a:r>
           </a:p>
         </p:txBody>
@@ -7443,17 +7838,17 @@
             </a:pPr>
             <a:r>
               <a:rPr lang="fr-FR" dirty="0"/>
-              <a:t>Diodes</a:t>
+              <a:t>Pont diviseur</a:t>
             </a:r>
           </a:p>
         </p:txBody>
       </p:sp>
       <p:pic>
         <p:nvPicPr>
-          <p:cNvPr id="11" name="Image 10">
-            <a:extLst>
-              <a:ext uri="{FF2B5EF4-FFF2-40B4-BE49-F238E27FC236}">
-                <a16:creationId xmlns:a16="http://schemas.microsoft.com/office/drawing/2014/main" id="{53E358D8-B69A-56BE-8E7D-78F5258C4662}"/>
+          <p:cNvPr id="6" name="Image 5">
+            <a:extLst>
+              <a:ext uri="{FF2B5EF4-FFF2-40B4-BE49-F238E27FC236}">
+                <a16:creationId xmlns:a16="http://schemas.microsoft.com/office/drawing/2014/main" id="{94EC9E2E-4F4D-52EA-E31A-F3A41894C018}"/>
               </a:ext>
             </a:extLst>
           </p:cNvPr>
@@ -7470,8 +7865,8 @@
         </p:blipFill>
         <p:spPr>
           <a:xfrm>
-            <a:off x="3691923" y="2364264"/>
-            <a:ext cx="7776000" cy="4320000"/>
+            <a:off x="5636116" y="2464816"/>
+            <a:ext cx="5198310" cy="3557368"/>
           </a:xfrm>
           <a:prstGeom prst="rect">
             <a:avLst/>
@@ -7531,7 +7926,7 @@
           <a:p>
             <a:r>
               <a:rPr lang="fr-FR" dirty="0"/>
-              <a:t>M4 - Additionner des signaux</a:t>
+              <a:t>M2 – Elever une tension</a:t>
             </a:r>
           </a:p>
         </p:txBody>
@@ -7606,7 +8001,7 @@
             </a:pPr>
             <a:r>
               <a:rPr lang="fr-FR" dirty="0"/>
-              <a:t>ALI : montage additionneur</a:t>
+              <a:t>Montage amplificateur</a:t>
             </a:r>
           </a:p>
         </p:txBody>
@@ -7616,7 +8011,7 @@
           <p:cNvPr id="7" name="Image 6">
             <a:extLst>
               <a:ext uri="{FF2B5EF4-FFF2-40B4-BE49-F238E27FC236}">
-                <a16:creationId xmlns:a16="http://schemas.microsoft.com/office/drawing/2014/main" id="{B35D58F1-8865-34F3-CC12-3987DB61EB42}"/>
+                <a16:creationId xmlns:a16="http://schemas.microsoft.com/office/drawing/2014/main" id="{22848224-6E90-D97C-5455-C2B9AAC22302}"/>
               </a:ext>
             </a:extLst>
           </p:cNvPr>
@@ -7633,8 +8028,8 @@
         </p:blipFill>
         <p:spPr>
           <a:xfrm>
-            <a:off x="4874658" y="3325461"/>
-            <a:ext cx="5896436" cy="2983899"/>
+            <a:off x="6268278" y="2089441"/>
+            <a:ext cx="4715633" cy="4219919"/>
           </a:xfrm>
           <a:prstGeom prst="rect">
             <a:avLst/>
@@ -7644,7 +8039,7 @@
     </p:spTree>
     <p:extLst>
       <p:ext uri="{BB962C8B-B14F-4D97-AF65-F5344CB8AC3E}">
-        <p14:creationId xmlns:p14="http://schemas.microsoft.com/office/powerpoint/2010/main" val="2723905820"/>
+        <p14:creationId xmlns:p14="http://schemas.microsoft.com/office/powerpoint/2010/main" val="3427174159"/>
       </p:ext>
     </p:extLst>
   </p:cSld>
@@ -7671,6 +8066,505 @@
           <a:chExt cx="0" cy="0"/>
         </a:xfrm>
       </p:grpSpPr>
+      <p:sp>
+        <p:nvSpPr>
+          <p:cNvPr id="2" name="Titre 1">
+            <a:extLst>
+              <a:ext uri="{FF2B5EF4-FFF2-40B4-BE49-F238E27FC236}">
+                <a16:creationId xmlns:a16="http://schemas.microsoft.com/office/drawing/2014/main" id="{90162AE8-C1B0-5C56-8313-DEE494F38273}"/>
+              </a:ext>
+            </a:extLst>
+          </p:cNvPr>
+          <p:cNvSpPr>
+            <a:spLocks noGrp="1"/>
+          </p:cNvSpPr>
+          <p:nvPr>
+            <p:ph type="title"/>
+          </p:nvPr>
+        </p:nvSpPr>
+        <p:spPr/>
+        <p:txBody>
+          <a:bodyPr/>
+          <a:lstStyle/>
+          <a:p>
+            <a:r>
+              <a:rPr lang="fr-FR" dirty="0"/>
+              <a:t>M3 - Limiter une tension</a:t>
+            </a:r>
+          </a:p>
+        </p:txBody>
+      </p:sp>
+      <p:pic>
+        <p:nvPicPr>
+          <p:cNvPr id="5" name="Image 4" descr="Une image contenant texte&#10;&#10;Description générée automatiquement">
+            <a:extLst>
+              <a:ext uri="{FF2B5EF4-FFF2-40B4-BE49-F238E27FC236}">
+                <a16:creationId xmlns:a16="http://schemas.microsoft.com/office/drawing/2014/main" id="{204ADC40-1D61-539F-22ED-6B21D67FBDE6}"/>
+              </a:ext>
+            </a:extLst>
+          </p:cNvPr>
+          <p:cNvPicPr>
+            <a:picLocks noChangeAspect="1"/>
+          </p:cNvPicPr>
+          <p:nvPr/>
+        </p:nvPicPr>
+        <p:blipFill>
+          <a:blip r:embed="rId2" cstate="print">
+            <a:extLst>
+              <a:ext uri="{28A0092B-C50C-407E-A947-70E740481C1C}">
+                <a14:useLocalDpi xmlns:a14="http://schemas.microsoft.com/office/drawing/2010/main" val="0"/>
+              </a:ext>
+            </a:extLst>
+          </a:blip>
+          <a:stretch>
+            <a:fillRect/>
+          </a:stretch>
+        </p:blipFill>
+        <p:spPr>
+          <a:xfrm>
+            <a:off x="202922" y="5934456"/>
+            <a:ext cx="1825291" cy="749808"/>
+          </a:xfrm>
+          <a:prstGeom prst="rect">
+            <a:avLst/>
+          </a:prstGeom>
+        </p:spPr>
+      </p:pic>
+      <p:sp>
+        <p:nvSpPr>
+          <p:cNvPr id="3" name="Espace réservé du contenu 2">
+            <a:extLst>
+              <a:ext uri="{FF2B5EF4-FFF2-40B4-BE49-F238E27FC236}">
+                <a16:creationId xmlns:a16="http://schemas.microsoft.com/office/drawing/2014/main" id="{0BEC7A2C-A17B-6386-59E3-FD868FE4C649}"/>
+              </a:ext>
+            </a:extLst>
+          </p:cNvPr>
+          <p:cNvSpPr>
+            <a:spLocks noGrp="1"/>
+          </p:cNvSpPr>
+          <p:nvPr>
+            <p:ph sz="half" idx="1"/>
+          </p:nvPr>
+        </p:nvSpPr>
+        <p:spPr>
+          <a:xfrm>
+            <a:off x="1115568" y="2478024"/>
+            <a:ext cx="5152710" cy="3694176"/>
+          </a:xfrm>
+        </p:spPr>
+        <p:txBody>
+          <a:bodyPr>
+            <a:normAutofit/>
+          </a:bodyPr>
+          <a:lstStyle/>
+          <a:p>
+            <a:pPr>
+              <a:buFont typeface="Arial" panose="020B0604020202020204" pitchFamily="34" charset="0"/>
+              <a:buChar char="•"/>
+            </a:pPr>
+            <a:r>
+              <a:rPr lang="fr-FR" dirty="0"/>
+              <a:t>Diodes</a:t>
+            </a:r>
+          </a:p>
+        </p:txBody>
+      </p:sp>
+      <p:pic>
+        <p:nvPicPr>
+          <p:cNvPr id="11" name="Image 10">
+            <a:extLst>
+              <a:ext uri="{FF2B5EF4-FFF2-40B4-BE49-F238E27FC236}">
+                <a16:creationId xmlns:a16="http://schemas.microsoft.com/office/drawing/2014/main" id="{53E358D8-B69A-56BE-8E7D-78F5258C4662}"/>
+              </a:ext>
+            </a:extLst>
+          </p:cNvPr>
+          <p:cNvPicPr>
+            <a:picLocks noChangeAspect="1"/>
+          </p:cNvPicPr>
+          <p:nvPr/>
+        </p:nvPicPr>
+        <p:blipFill>
+          <a:blip r:embed="rId3"/>
+          <a:stretch>
+            <a:fillRect/>
+          </a:stretch>
+        </p:blipFill>
+        <p:spPr>
+          <a:xfrm>
+            <a:off x="3691923" y="2364264"/>
+            <a:ext cx="7776000" cy="4320000"/>
+          </a:xfrm>
+          <a:prstGeom prst="rect">
+            <a:avLst/>
+          </a:prstGeom>
+        </p:spPr>
+      </p:pic>
+    </p:spTree>
+    <p:extLst>
+      <p:ext uri="{BB962C8B-B14F-4D97-AF65-F5344CB8AC3E}">
+        <p14:creationId xmlns:p14="http://schemas.microsoft.com/office/powerpoint/2010/main" val="3139951487"/>
+      </p:ext>
+    </p:extLst>
+  </p:cSld>
+  <p:clrMapOvr>
+    <a:masterClrMapping/>
+  </p:clrMapOvr>
+</p:sld>
+</file>
+
+<file path=ppt/slides/slide7.xml><?xml version="1.0" encoding="utf-8"?>
+<p:sld xmlns:a="http://schemas.openxmlformats.org/drawingml/2006/main" xmlns:r="http://schemas.openxmlformats.org/officeDocument/2006/relationships" xmlns:p="http://schemas.openxmlformats.org/presentationml/2006/main">
+  <p:cSld>
+    <p:spTree>
+      <p:nvGrpSpPr>
+        <p:cNvPr id="1" name=""/>
+        <p:cNvGrpSpPr/>
+        <p:nvPr/>
+      </p:nvGrpSpPr>
+      <p:grpSpPr>
+        <a:xfrm>
+          <a:off x="0" y="0"/>
+          <a:ext cx="0" cy="0"/>
+          <a:chOff x="0" y="0"/>
+          <a:chExt cx="0" cy="0"/>
+        </a:xfrm>
+      </p:grpSpPr>
+      <p:sp>
+        <p:nvSpPr>
+          <p:cNvPr id="2" name="Titre 1">
+            <a:extLst>
+              <a:ext uri="{FF2B5EF4-FFF2-40B4-BE49-F238E27FC236}">
+                <a16:creationId xmlns:a16="http://schemas.microsoft.com/office/drawing/2014/main" id="{90162AE8-C1B0-5C56-8313-DEE494F38273}"/>
+              </a:ext>
+            </a:extLst>
+          </p:cNvPr>
+          <p:cNvSpPr>
+            <a:spLocks noGrp="1"/>
+          </p:cNvSpPr>
+          <p:nvPr>
+            <p:ph type="title"/>
+          </p:nvPr>
+        </p:nvSpPr>
+        <p:spPr/>
+        <p:txBody>
+          <a:bodyPr/>
+          <a:lstStyle/>
+          <a:p>
+            <a:r>
+              <a:rPr lang="fr-FR" dirty="0"/>
+              <a:t>M4 – Amplifier un signal</a:t>
+            </a:r>
+          </a:p>
+        </p:txBody>
+      </p:sp>
+      <p:pic>
+        <p:nvPicPr>
+          <p:cNvPr id="5" name="Image 4" descr="Une image contenant texte&#10;&#10;Description générée automatiquement">
+            <a:extLst>
+              <a:ext uri="{FF2B5EF4-FFF2-40B4-BE49-F238E27FC236}">
+                <a16:creationId xmlns:a16="http://schemas.microsoft.com/office/drawing/2014/main" id="{204ADC40-1D61-539F-22ED-6B21D67FBDE6}"/>
+              </a:ext>
+            </a:extLst>
+          </p:cNvPr>
+          <p:cNvPicPr>
+            <a:picLocks noChangeAspect="1"/>
+          </p:cNvPicPr>
+          <p:nvPr/>
+        </p:nvPicPr>
+        <p:blipFill>
+          <a:blip r:embed="rId2" cstate="print">
+            <a:extLst>
+              <a:ext uri="{28A0092B-C50C-407E-A947-70E740481C1C}">
+                <a14:useLocalDpi xmlns:a14="http://schemas.microsoft.com/office/drawing/2010/main" val="0"/>
+              </a:ext>
+            </a:extLst>
+          </a:blip>
+          <a:stretch>
+            <a:fillRect/>
+          </a:stretch>
+        </p:blipFill>
+        <p:spPr>
+          <a:xfrm>
+            <a:off x="202922" y="5934456"/>
+            <a:ext cx="1825291" cy="749808"/>
+          </a:xfrm>
+          <a:prstGeom prst="rect">
+            <a:avLst/>
+          </a:prstGeom>
+        </p:spPr>
+      </p:pic>
+      <p:sp>
+        <p:nvSpPr>
+          <p:cNvPr id="3" name="Espace réservé du contenu 2">
+            <a:extLst>
+              <a:ext uri="{FF2B5EF4-FFF2-40B4-BE49-F238E27FC236}">
+                <a16:creationId xmlns:a16="http://schemas.microsoft.com/office/drawing/2014/main" id="{0BEC7A2C-A17B-6386-59E3-FD868FE4C649}"/>
+              </a:ext>
+            </a:extLst>
+          </p:cNvPr>
+          <p:cNvSpPr>
+            <a:spLocks noGrp="1"/>
+          </p:cNvSpPr>
+          <p:nvPr>
+            <p:ph sz="half" idx="1"/>
+          </p:nvPr>
+        </p:nvSpPr>
+        <p:spPr>
+          <a:xfrm>
+            <a:off x="1115568" y="2478024"/>
+            <a:ext cx="5152710" cy="3694176"/>
+          </a:xfrm>
+        </p:spPr>
+        <p:txBody>
+          <a:bodyPr>
+            <a:normAutofit/>
+          </a:bodyPr>
+          <a:lstStyle/>
+          <a:p>
+            <a:pPr>
+              <a:buFont typeface="Arial" panose="020B0604020202020204" pitchFamily="34" charset="0"/>
+              <a:buChar char="•"/>
+            </a:pPr>
+            <a:r>
+              <a:rPr lang="fr-FR" dirty="0"/>
+              <a:t>Montage amplificateur</a:t>
+            </a:r>
+          </a:p>
+          <a:p>
+            <a:pPr>
+              <a:buFont typeface="Arial" panose="020B0604020202020204" pitchFamily="34" charset="0"/>
+              <a:buChar char="•"/>
+            </a:pPr>
+            <a:r>
+              <a:rPr lang="fr-FR" dirty="0"/>
+              <a:t>(ici non-inverseur)</a:t>
+            </a:r>
+          </a:p>
+        </p:txBody>
+      </p:sp>
+      <p:pic>
+        <p:nvPicPr>
+          <p:cNvPr id="7" name="Image 6">
+            <a:extLst>
+              <a:ext uri="{FF2B5EF4-FFF2-40B4-BE49-F238E27FC236}">
+                <a16:creationId xmlns:a16="http://schemas.microsoft.com/office/drawing/2014/main" id="{22848224-6E90-D97C-5455-C2B9AAC22302}"/>
+              </a:ext>
+            </a:extLst>
+          </p:cNvPr>
+          <p:cNvPicPr>
+            <a:picLocks noChangeAspect="1"/>
+          </p:cNvPicPr>
+          <p:nvPr/>
+        </p:nvPicPr>
+        <p:blipFill>
+          <a:blip r:embed="rId3"/>
+          <a:stretch>
+            <a:fillRect/>
+          </a:stretch>
+        </p:blipFill>
+        <p:spPr>
+          <a:xfrm>
+            <a:off x="6268278" y="2089441"/>
+            <a:ext cx="4715633" cy="4219919"/>
+          </a:xfrm>
+          <a:prstGeom prst="rect">
+            <a:avLst/>
+          </a:prstGeom>
+        </p:spPr>
+      </p:pic>
+    </p:spTree>
+    <p:extLst>
+      <p:ext uri="{BB962C8B-B14F-4D97-AF65-F5344CB8AC3E}">
+        <p14:creationId xmlns:p14="http://schemas.microsoft.com/office/powerpoint/2010/main" val="3573051922"/>
+      </p:ext>
+    </p:extLst>
+  </p:cSld>
+  <p:clrMapOvr>
+    <a:masterClrMapping/>
+  </p:clrMapOvr>
+</p:sld>
+</file>
+
+<file path=ppt/slides/slide8.xml><?xml version="1.0" encoding="utf-8"?>
+<p:sld xmlns:a="http://schemas.openxmlformats.org/drawingml/2006/main" xmlns:r="http://schemas.openxmlformats.org/officeDocument/2006/relationships" xmlns:p="http://schemas.openxmlformats.org/presentationml/2006/main">
+  <p:cSld>
+    <p:spTree>
+      <p:nvGrpSpPr>
+        <p:cNvPr id="1" name=""/>
+        <p:cNvGrpSpPr/>
+        <p:nvPr/>
+      </p:nvGrpSpPr>
+      <p:grpSpPr>
+        <a:xfrm>
+          <a:off x="0" y="0"/>
+          <a:ext cx="0" cy="0"/>
+          <a:chOff x="0" y="0"/>
+          <a:chExt cx="0" cy="0"/>
+        </a:xfrm>
+      </p:grpSpPr>
+      <p:sp>
+        <p:nvSpPr>
+          <p:cNvPr id="2" name="Titre 1">
+            <a:extLst>
+              <a:ext uri="{FF2B5EF4-FFF2-40B4-BE49-F238E27FC236}">
+                <a16:creationId xmlns:a16="http://schemas.microsoft.com/office/drawing/2014/main" id="{90162AE8-C1B0-5C56-8313-DEE494F38273}"/>
+              </a:ext>
+            </a:extLst>
+          </p:cNvPr>
+          <p:cNvSpPr>
+            <a:spLocks noGrp="1"/>
+          </p:cNvSpPr>
+          <p:nvPr>
+            <p:ph type="title"/>
+          </p:nvPr>
+        </p:nvSpPr>
+        <p:spPr/>
+        <p:txBody>
+          <a:bodyPr/>
+          <a:lstStyle/>
+          <a:p>
+            <a:r>
+              <a:rPr lang="fr-FR" dirty="0"/>
+              <a:t>M5 - Additionner des signaux</a:t>
+            </a:r>
+          </a:p>
+        </p:txBody>
+      </p:sp>
+      <p:pic>
+        <p:nvPicPr>
+          <p:cNvPr id="5" name="Image 4" descr="Une image contenant texte&#10;&#10;Description générée automatiquement">
+            <a:extLst>
+              <a:ext uri="{FF2B5EF4-FFF2-40B4-BE49-F238E27FC236}">
+                <a16:creationId xmlns:a16="http://schemas.microsoft.com/office/drawing/2014/main" id="{204ADC40-1D61-539F-22ED-6B21D67FBDE6}"/>
+              </a:ext>
+            </a:extLst>
+          </p:cNvPr>
+          <p:cNvPicPr>
+            <a:picLocks noChangeAspect="1"/>
+          </p:cNvPicPr>
+          <p:nvPr/>
+        </p:nvPicPr>
+        <p:blipFill>
+          <a:blip r:embed="rId2" cstate="print">
+            <a:extLst>
+              <a:ext uri="{28A0092B-C50C-407E-A947-70E740481C1C}">
+                <a14:useLocalDpi xmlns:a14="http://schemas.microsoft.com/office/drawing/2010/main" val="0"/>
+              </a:ext>
+            </a:extLst>
+          </a:blip>
+          <a:stretch>
+            <a:fillRect/>
+          </a:stretch>
+        </p:blipFill>
+        <p:spPr>
+          <a:xfrm>
+            <a:off x="202922" y="5934456"/>
+            <a:ext cx="1825291" cy="749808"/>
+          </a:xfrm>
+          <a:prstGeom prst="rect">
+            <a:avLst/>
+          </a:prstGeom>
+        </p:spPr>
+      </p:pic>
+      <p:sp>
+        <p:nvSpPr>
+          <p:cNvPr id="3" name="Espace réservé du contenu 2">
+            <a:extLst>
+              <a:ext uri="{FF2B5EF4-FFF2-40B4-BE49-F238E27FC236}">
+                <a16:creationId xmlns:a16="http://schemas.microsoft.com/office/drawing/2014/main" id="{0BEC7A2C-A17B-6386-59E3-FD868FE4C649}"/>
+              </a:ext>
+            </a:extLst>
+          </p:cNvPr>
+          <p:cNvSpPr>
+            <a:spLocks noGrp="1"/>
+          </p:cNvSpPr>
+          <p:nvPr>
+            <p:ph sz="half" idx="1"/>
+          </p:nvPr>
+        </p:nvSpPr>
+        <p:spPr>
+          <a:xfrm>
+            <a:off x="1115568" y="2478024"/>
+            <a:ext cx="5152710" cy="3694176"/>
+          </a:xfrm>
+        </p:spPr>
+        <p:txBody>
+          <a:bodyPr>
+            <a:normAutofit/>
+          </a:bodyPr>
+          <a:lstStyle/>
+          <a:p>
+            <a:pPr>
+              <a:buFont typeface="Arial" panose="020B0604020202020204" pitchFamily="34" charset="0"/>
+              <a:buChar char="•"/>
+            </a:pPr>
+            <a:r>
+              <a:rPr lang="fr-FR" dirty="0"/>
+              <a:t>ALI : montage additionneur</a:t>
+            </a:r>
+          </a:p>
+        </p:txBody>
+      </p:sp>
+      <p:pic>
+        <p:nvPicPr>
+          <p:cNvPr id="7" name="Image 6">
+            <a:extLst>
+              <a:ext uri="{FF2B5EF4-FFF2-40B4-BE49-F238E27FC236}">
+                <a16:creationId xmlns:a16="http://schemas.microsoft.com/office/drawing/2014/main" id="{B35D58F1-8865-34F3-CC12-3987DB61EB42}"/>
+              </a:ext>
+            </a:extLst>
+          </p:cNvPr>
+          <p:cNvPicPr>
+            <a:picLocks noChangeAspect="1"/>
+          </p:cNvPicPr>
+          <p:nvPr/>
+        </p:nvPicPr>
+        <p:blipFill>
+          <a:blip r:embed="rId3"/>
+          <a:stretch>
+            <a:fillRect/>
+          </a:stretch>
+        </p:blipFill>
+        <p:spPr>
+          <a:xfrm>
+            <a:off x="4874658" y="3325461"/>
+            <a:ext cx="5896436" cy="2983899"/>
+          </a:xfrm>
+          <a:prstGeom prst="rect">
+            <a:avLst/>
+          </a:prstGeom>
+        </p:spPr>
+      </p:pic>
+    </p:spTree>
+    <p:extLst>
+      <p:ext uri="{BB962C8B-B14F-4D97-AF65-F5344CB8AC3E}">
+        <p14:creationId xmlns:p14="http://schemas.microsoft.com/office/powerpoint/2010/main" val="2723905820"/>
+      </p:ext>
+    </p:extLst>
+  </p:cSld>
+  <p:clrMapOvr>
+    <a:masterClrMapping/>
+  </p:clrMapOvr>
+</p:sld>
+</file>
+
+<file path=ppt/slides/slide9.xml><?xml version="1.0" encoding="utf-8"?>
+<p:sld xmlns:a="http://schemas.openxmlformats.org/drawingml/2006/main" xmlns:r="http://schemas.openxmlformats.org/officeDocument/2006/relationships" xmlns:p="http://schemas.openxmlformats.org/presentationml/2006/main">
+  <p:cSld>
+    <p:spTree>
+      <p:nvGrpSpPr>
+        <p:cNvPr id="1" name=""/>
+        <p:cNvGrpSpPr/>
+        <p:nvPr/>
+      </p:nvGrpSpPr>
+      <p:grpSpPr>
+        <a:xfrm>
+          <a:off x="0" y="0"/>
+          <a:ext cx="0" cy="0"/>
+          <a:chOff x="0" y="0"/>
+          <a:chExt cx="0" cy="0"/>
+        </a:xfrm>
+      </p:grpSpPr>
       <p:pic>
         <p:nvPicPr>
           <p:cNvPr id="6" name="Image 5">
@@ -7726,7 +8620,7 @@
           <a:p>
             <a:r>
               <a:rPr lang="fr-FR" dirty="0"/>
-              <a:t>M5 - Mettre en forme un capteur de température</a:t>
+              <a:t>M6 - Mettre en forme un capteur de température</a:t>
             </a:r>
           </a:p>
         </p:txBody>

</xml_diff>